<commit_message>
Update to final version
</commit_message>
<xml_diff>
--- a/presentations/Adaptive Real-Time Strategic Agent for StarCraft.pptx
+++ b/presentations/Adaptive Real-Time Strategic Agent for StarCraft.pptx
@@ -297,7 +297,7 @@
           <a:p>
             <a:fld id="{F150A26E-7FCF-5C48-93D1-3447E58FCE05}" type="datetimeFigureOut">
               <a:rPr lang="en-US" smtClean="0"/>
-              <a:t>12/6/2013</a:t>
+              <a:t>12/7/2013</a:t>
             </a:fld>
             <a:endParaRPr lang="en-US"/>
           </a:p>
@@ -467,7 +467,7 @@
           <a:p>
             <a:fld id="{F150A26E-7FCF-5C48-93D1-3447E58FCE05}" type="datetimeFigureOut">
               <a:rPr lang="en-US" smtClean="0"/>
-              <a:t>12/6/2013</a:t>
+              <a:t>12/7/2013</a:t>
             </a:fld>
             <a:endParaRPr lang="en-US"/>
           </a:p>
@@ -647,7 +647,7 @@
           <a:p>
             <a:fld id="{F150A26E-7FCF-5C48-93D1-3447E58FCE05}" type="datetimeFigureOut">
               <a:rPr lang="en-US" smtClean="0"/>
-              <a:t>12/6/2013</a:t>
+              <a:t>12/7/2013</a:t>
             </a:fld>
             <a:endParaRPr lang="en-US"/>
           </a:p>
@@ -817,7 +817,7 @@
           <a:p>
             <a:fld id="{F150A26E-7FCF-5C48-93D1-3447E58FCE05}" type="datetimeFigureOut">
               <a:rPr lang="en-US" smtClean="0"/>
-              <a:t>12/6/2013</a:t>
+              <a:t>12/7/2013</a:t>
             </a:fld>
             <a:endParaRPr lang="en-US"/>
           </a:p>
@@ -1063,7 +1063,7 @@
           <a:p>
             <a:fld id="{F150A26E-7FCF-5C48-93D1-3447E58FCE05}" type="datetimeFigureOut">
               <a:rPr lang="en-US" smtClean="0"/>
-              <a:t>12/6/2013</a:t>
+              <a:t>12/7/2013</a:t>
             </a:fld>
             <a:endParaRPr lang="en-US"/>
           </a:p>
@@ -1351,7 +1351,7 @@
           <a:p>
             <a:fld id="{F150A26E-7FCF-5C48-93D1-3447E58FCE05}" type="datetimeFigureOut">
               <a:rPr lang="en-US" smtClean="0"/>
-              <a:t>12/6/2013</a:t>
+              <a:t>12/7/2013</a:t>
             </a:fld>
             <a:endParaRPr lang="en-US"/>
           </a:p>
@@ -1773,7 +1773,7 @@
           <a:p>
             <a:fld id="{F150A26E-7FCF-5C48-93D1-3447E58FCE05}" type="datetimeFigureOut">
               <a:rPr lang="en-US" smtClean="0"/>
-              <a:t>12/6/2013</a:t>
+              <a:t>12/7/2013</a:t>
             </a:fld>
             <a:endParaRPr lang="en-US"/>
           </a:p>
@@ -1891,7 +1891,7 @@
           <a:p>
             <a:fld id="{F150A26E-7FCF-5C48-93D1-3447E58FCE05}" type="datetimeFigureOut">
               <a:rPr lang="en-US" smtClean="0"/>
-              <a:t>12/6/2013</a:t>
+              <a:t>12/7/2013</a:t>
             </a:fld>
             <a:endParaRPr lang="en-US"/>
           </a:p>
@@ -1986,7 +1986,7 @@
           <a:p>
             <a:fld id="{F150A26E-7FCF-5C48-93D1-3447E58FCE05}" type="datetimeFigureOut">
               <a:rPr lang="en-US" smtClean="0"/>
-              <a:t>12/6/2013</a:t>
+              <a:t>12/7/2013</a:t>
             </a:fld>
             <a:endParaRPr lang="en-US"/>
           </a:p>
@@ -2263,7 +2263,7 @@
           <a:p>
             <a:fld id="{F150A26E-7FCF-5C48-93D1-3447E58FCE05}" type="datetimeFigureOut">
               <a:rPr lang="en-US" smtClean="0"/>
-              <a:t>12/6/2013</a:t>
+              <a:t>12/7/2013</a:t>
             </a:fld>
             <a:endParaRPr lang="en-US"/>
           </a:p>
@@ -2516,7 +2516,7 @@
           <a:p>
             <a:fld id="{F150A26E-7FCF-5C48-93D1-3447E58FCE05}" type="datetimeFigureOut">
               <a:rPr lang="en-US" smtClean="0"/>
-              <a:t>12/6/2013</a:t>
+              <a:t>12/7/2013</a:t>
             </a:fld>
             <a:endParaRPr lang="en-US"/>
           </a:p>
@@ -2729,7 +2729,7 @@
           <a:p>
             <a:fld id="{F150A26E-7FCF-5C48-93D1-3447E58FCE05}" type="datetimeFigureOut">
               <a:rPr lang="en-US" smtClean="0"/>
-              <a:t>12/6/2013</a:t>
+              <a:t>12/7/2013</a:t>
             </a:fld>
             <a:endParaRPr lang="en-US"/>
           </a:p>
@@ -3156,11 +3156,7 @@
           <a:p>
             <a:r>
               <a:rPr lang="en-US" sz="2400" dirty="0" smtClean="0"/>
-              <a:t>Student </a:t>
-            </a:r>
-            <a:r>
-              <a:rPr lang="en-US" sz="2400" dirty="0" smtClean="0"/>
-              <a:t>Name</a:t>
+              <a:t>Student Name</a:t>
             </a:r>
             <a:endParaRPr lang="en-US" sz="2400" dirty="0"/>
           </a:p>
@@ -3176,11 +3172,7 @@
           <a:p>
             <a:r>
               <a:rPr lang="en-US" sz="2400" dirty="0" smtClean="0"/>
-              <a:t>Advisor </a:t>
-            </a:r>
-            <a:r>
-              <a:rPr lang="en-US" sz="2400" dirty="0" smtClean="0"/>
-              <a:t>Name</a:t>
+              <a:t>Advisor Name</a:t>
             </a:r>
           </a:p>
           <a:p>
@@ -3218,6 +3210,13 @@
   <p:clrMapOvr>
     <a:masterClrMapping/>
   </p:clrMapOvr>
+  <p:timing>
+    <p:tnLst>
+      <p:par>
+        <p:cTn id="1" dur="indefinite" restart="never" nodeType="tmRoot"/>
+      </p:par>
+    </p:tnLst>
+  </p:timing>
 </p:sld>
 </file>
 
@@ -3284,11 +3283,7 @@
             </a:r>
             <a:r>
               <a:rPr lang="en-US" smtClean="0"/>
-              <a:t>you </a:t>
-            </a:r>
-            <a:r>
-              <a:rPr lang="en-US" smtClean="0"/>
-              <a:t>!</a:t>
+              <a:t>you !</a:t>
             </a:r>
             <a:endParaRPr lang="en-US" dirty="0"/>
           </a:p>
@@ -3304,6 +3299,13 @@
   <p:clrMapOvr>
     <a:masterClrMapping/>
   </p:clrMapOvr>
+  <p:timing>
+    <p:tnLst>
+      <p:par>
+        <p:cTn id="1" dur="indefinite" restart="never" nodeType="tmRoot"/>
+      </p:par>
+    </p:tnLst>
+  </p:timing>
 </p:sld>
 </file>
 
@@ -3341,11 +3343,7 @@
           <a:p>
             <a:r>
               <a:rPr lang="en-US" dirty="0" smtClean="0"/>
-              <a:t>Problem </a:t>
-            </a:r>
-            <a:r>
-              <a:rPr lang="en-US" dirty="0" smtClean="0"/>
-              <a:t>Motivation [1]</a:t>
+              <a:t>Problem Motivation [1]</a:t>
             </a:r>
             <a:endParaRPr lang="en-US" dirty="0"/>
           </a:p>
@@ -3364,7 +3362,7 @@
         <p:spPr/>
         <p:txBody>
           <a:bodyPr>
-            <a:normAutofit fontScale="92500" lnSpcReduction="10000"/>
+            <a:normAutofit fontScale="92500" lnSpcReduction="20000"/>
           </a:bodyPr>
           <a:lstStyle/>
           <a:p>
@@ -3377,8 +3375,16 @@
             <a:pPr lvl="1"/>
             <a:r>
               <a:rPr lang="en-US" dirty="0" smtClean="0"/>
-              <a:t>Static AI, boring, can’t teach bot</a:t>
-            </a:r>
+              <a:t>Static AI, boring, can’t teach </a:t>
+            </a:r>
+            <a:r>
+              <a:rPr lang="en-US" dirty="0" smtClean="0"/>
+              <a:t>bot</a:t>
+            </a:r>
+          </a:p>
+          <a:p>
+            <a:pPr lvl="1"/>
+            <a:endParaRPr lang="en-US" dirty="0" smtClean="0"/>
           </a:p>
           <a:p>
             <a:r>
@@ -3521,11 +3527,7 @@
             <a:pPr algn="ctr"/>
             <a:r>
               <a:rPr lang="en-US" b="1" dirty="0" smtClean="0"/>
-              <a:t>Real-Time Strategy Games</a:t>
-            </a:r>
-            <a:r>
-              <a:rPr lang="en-US" b="1" dirty="0" smtClean="0"/>
-              <a:t>.</a:t>
+              <a:t>Real-Time Strategy Games.</a:t>
             </a:r>
           </a:p>
           <a:p>
@@ -4629,8 +4631,17 @@
             </a:r>
             <a:r>
               <a:rPr lang="en-US" dirty="0" smtClean="0"/>
-              <a:t>, adaptive, not intelligent, not real-time</a:t>
-            </a:r>
+              <a:t>, adaptive, not intelligent, not </a:t>
+            </a:r>
+            <a:r>
+              <a:rPr lang="en-US" dirty="0" smtClean="0"/>
+              <a:t>real-time</a:t>
+            </a:r>
+          </a:p>
+          <a:p>
+            <a:pPr marL="457200" lvl="1" indent="0">
+              <a:buNone/>
+            </a:pPr>
             <a:endParaRPr lang="en-US" dirty="0"/>
           </a:p>
           <a:p>
@@ -4651,11 +4662,7 @@
             <a:pPr lvl="1"/>
             <a:r>
               <a:rPr lang="en-US" dirty="0" smtClean="0"/>
-              <a:t>Observance, Adaptive</a:t>
-            </a:r>
-            <a:r>
-              <a:rPr lang="en-US" dirty="0" smtClean="0"/>
-              <a:t>, intelligent, not real-time</a:t>
+              <a:t>Observance, Adaptive, intelligent, not real-time</a:t>
             </a:r>
           </a:p>
         </p:txBody>
@@ -4753,8 +4760,16 @@
             <a:pPr lvl="1"/>
             <a:r>
               <a:rPr lang="en-US" dirty="0"/>
-              <a:t>Not observance, adaptive, intelligent, not real-time</a:t>
-            </a:r>
+              <a:t>Not observance, adaptive, intelligent, not </a:t>
+            </a:r>
+            <a:r>
+              <a:rPr lang="en-US" dirty="0" smtClean="0"/>
+              <a:t>real-time</a:t>
+            </a:r>
+          </a:p>
+          <a:p>
+            <a:pPr lvl="1"/>
+            <a:endParaRPr lang="en-US" dirty="0"/>
           </a:p>
           <a:p>
             <a:r>
@@ -4776,6 +4791,24 @@
             <a:r>
               <a:rPr lang="en-US" dirty="0" smtClean="0"/>
               <a:t>real-time</a:t>
+            </a:r>
+          </a:p>
+          <a:p>
+            <a:pPr lvl="1"/>
+            <a:endParaRPr lang="en-US" dirty="0"/>
+          </a:p>
+          <a:p>
+            <a:r>
+              <a:rPr lang="en-US" dirty="0" err="1" smtClean="0"/>
+              <a:t>Drivatar</a:t>
+            </a:r>
+            <a:r>
+              <a:rPr lang="en-US" dirty="0"/>
+              <a:t> </a:t>
+            </a:r>
+            <a:r>
+              <a:rPr lang="en-US" dirty="0" smtClean="0"/>
+              <a:t>[6]</a:t>
             </a:r>
             <a:endParaRPr lang="en-US" dirty="0"/>
           </a:p>
@@ -4867,8 +4900,13 @@
             <a:pPr lvl="1"/>
             <a:r>
               <a:rPr lang="en-US" dirty="0" smtClean="0"/>
-              <a:t>Standard is 30 – 60 FPS [6]</a:t>
-            </a:r>
+              <a:t>Standard is 30 – 60 FPS </a:t>
+            </a:r>
+            <a:r>
+              <a:rPr lang="en-US" dirty="0" smtClean="0"/>
+              <a:t>[7]</a:t>
+            </a:r>
+            <a:endParaRPr lang="en-US" dirty="0" smtClean="0"/>
           </a:p>
           <a:p>
             <a:pPr lvl="1"/>
@@ -4921,6 +4959,13 @@
   <p:clrMapOvr>
     <a:masterClrMapping/>
   </p:clrMapOvr>
+  <p:timing>
+    <p:tnLst>
+      <p:par>
+        <p:cTn id="1" dur="indefinite" restart="never" nodeType="tmRoot"/>
+      </p:par>
+    </p:tnLst>
+  </p:timing>
 </p:sld>
 </file>
 
@@ -4977,7 +5022,7 @@
         <p:spPr/>
         <p:txBody>
           <a:bodyPr>
-            <a:normAutofit/>
+            <a:normAutofit fontScale="92500" lnSpcReduction="10000"/>
           </a:bodyPr>
           <a:lstStyle/>
           <a:p>
@@ -5107,8 +5152,72 @@
               <a:buNone/>
             </a:pPr>
             <a:r>
+              <a:rPr lang="en-US" sz="1800" dirty="0" smtClean="0"/>
+              <a:t>[6] Microsoft Research</a:t>
+            </a:r>
+            <a:r>
               <a:rPr lang="en-US" sz="1800" dirty="0"/>
-              <a:t>[6] Wikipedia, "Frame rate," Wikimedia Foundation, 24 11 2013. [Online]. Available: http://en.wikipedia.org/wiki/Frame_rate#Video_games. [Accessed 28 11 2013].</a:t>
+              <a:t>, " </a:t>
+            </a:r>
+            <a:r>
+              <a:rPr lang="en-US" sz="1800" dirty="0" err="1"/>
+              <a:t>Drivatar</a:t>
+            </a:r>
+            <a:r>
+              <a:rPr lang="en-US" sz="1800" dirty="0"/>
+              <a:t>™ in </a:t>
+            </a:r>
+            <a:r>
+              <a:rPr lang="en-US" sz="1800" dirty="0" err="1"/>
+              <a:t>Forza</a:t>
+            </a:r>
+            <a:r>
+              <a:rPr lang="en-US" sz="1800" dirty="0"/>
+              <a:t> Motorsport," </a:t>
+            </a:r>
+            <a:r>
+              <a:rPr lang="en-US" sz="1800" dirty="0" smtClean="0"/>
+              <a:t>Microsoft Corporation,. </a:t>
+            </a:r>
+            <a:r>
+              <a:rPr lang="en-US" sz="1800" dirty="0"/>
+              <a:t>[Online]. Available: </a:t>
+            </a:r>
+            <a:r>
+              <a:rPr lang="en-US" sz="1800" dirty="0">
+                <a:hlinkClick r:id="rId2"/>
+              </a:rPr>
+              <a:t>http://research.microsoft.com/en-us/projects/drivatar/forza.aspx</a:t>
+            </a:r>
+            <a:r>
+              <a:rPr lang="en-US" sz="1800" dirty="0" smtClean="0"/>
+              <a:t>. </a:t>
+            </a:r>
+            <a:r>
+              <a:rPr lang="en-US" sz="1800" dirty="0"/>
+              <a:t>[Accessed </a:t>
+            </a:r>
+            <a:r>
+              <a:rPr lang="en-US" sz="1800" smtClean="0"/>
+              <a:t>7 12 </a:t>
+            </a:r>
+            <a:r>
+              <a:rPr lang="en-US" sz="1800" dirty="0"/>
+              <a:t>2013].</a:t>
+            </a:r>
+            <a:endParaRPr lang="en-US" sz="1800" dirty="0" smtClean="0"/>
+          </a:p>
+          <a:p>
+            <a:pPr marL="0" indent="0">
+              <a:buNone/>
+            </a:pPr>
+            <a:r>
+              <a:rPr lang="en-US" sz="1800" dirty="0" smtClean="0"/>
+              <a:t>[7] </a:t>
+            </a:r>
+            <a:r>
+              <a:rPr lang="en-US" sz="1800" dirty="0"/>
+              <a:t>Wikipedia, "Frame rate," Wikimedia Foundation, 24 11 2013. [Online]. Available: http://en.wikipedia.org/wiki/Frame_rate#Video_games. [Accessed 28 11 2013].</a:t>
             </a:r>
             <a:endParaRPr lang="en-US" sz="1800" dirty="0" smtClean="0"/>
           </a:p>
@@ -5130,6 +5239,13 @@
   <p:clrMapOvr>
     <a:masterClrMapping/>
   </p:clrMapOvr>
+  <p:timing>
+    <p:tnLst>
+      <p:par>
+        <p:cTn id="1" dur="indefinite" restart="never" nodeType="tmRoot"/>
+      </p:par>
+    </p:tnLst>
+  </p:timing>
 </p:sld>
 </file>
 

</xml_diff>